<commit_message>
Upload Files & Source
</commit_message>
<xml_diff>
--- a/lesson07.pptx
+++ b/lesson07.pptx
@@ -178,7 +178,7 @@
   <pc:docChgLst>
     <pc:chgData name="Anatoliy Kigel" userId="7432c6c4687b0a9c" providerId="LiveId" clId="{5D4AC314-1861-4644-8302-1371808BB05F}"/>
     <pc:docChg chg="undo redo custSel addSld delSld modSld sldOrd modSection">
-      <pc:chgData name="Anatoliy Kigel" userId="7432c6c4687b0a9c" providerId="LiveId" clId="{5D4AC314-1861-4644-8302-1371808BB05F}" dt="2021-11-15T10:16:29.880" v="580" actId="1035"/>
+      <pc:chgData name="Anatoliy Kigel" userId="7432c6c4687b0a9c" providerId="LiveId" clId="{5D4AC314-1861-4644-8302-1371808BB05F}" dt="2021-11-20T11:56:32.676" v="612" actId="552"/>
       <pc:docMkLst>
         <pc:docMk/>
       </pc:docMkLst>
@@ -546,13 +546,13 @@
         </pc:spChg>
       </pc:sldChg>
       <pc:sldChg chg="modSp add mod">
-        <pc:chgData name="Anatoliy Kigel" userId="7432c6c4687b0a9c" providerId="LiveId" clId="{5D4AC314-1861-4644-8302-1371808BB05F}" dt="2021-11-15T09:32:35.512" v="240" actId="403"/>
+        <pc:chgData name="Anatoliy Kigel" userId="7432c6c4687b0a9c" providerId="LiveId" clId="{5D4AC314-1861-4644-8302-1371808BB05F}" dt="2021-11-20T11:54:24.715" v="582" actId="20577"/>
         <pc:sldMkLst>
           <pc:docMk/>
           <pc:sldMk cId="1511881577" sldId="562"/>
         </pc:sldMkLst>
         <pc:spChg chg="mod">
-          <ac:chgData name="Anatoliy Kigel" userId="7432c6c4687b0a9c" providerId="LiveId" clId="{5D4AC314-1861-4644-8302-1371808BB05F}" dt="2021-11-15T09:32:35.512" v="240" actId="403"/>
+          <ac:chgData name="Anatoliy Kigel" userId="7432c6c4687b0a9c" providerId="LiveId" clId="{5D4AC314-1861-4644-8302-1371808BB05F}" dt="2021-11-20T11:54:24.715" v="582" actId="20577"/>
           <ac:spMkLst>
             <pc:docMk/>
             <pc:sldMk cId="1511881577" sldId="562"/>
@@ -561,13 +561,13 @@
         </pc:spChg>
       </pc:sldChg>
       <pc:sldChg chg="addSp delSp modSp mod">
-        <pc:chgData name="Anatoliy Kigel" userId="7432c6c4687b0a9c" providerId="LiveId" clId="{5D4AC314-1861-4644-8302-1371808BB05F}" dt="2021-11-15T10:16:29.880" v="580" actId="1035"/>
+        <pc:chgData name="Anatoliy Kigel" userId="7432c6c4687b0a9c" providerId="LiveId" clId="{5D4AC314-1861-4644-8302-1371808BB05F}" dt="2021-11-20T11:56:32.676" v="612" actId="552"/>
         <pc:sldMkLst>
           <pc:docMk/>
           <pc:sldMk cId="3356359888" sldId="563"/>
         </pc:sldMkLst>
         <pc:spChg chg="mod">
-          <ac:chgData name="Anatoliy Kigel" userId="7432c6c4687b0a9c" providerId="LiveId" clId="{5D4AC314-1861-4644-8302-1371808BB05F}" dt="2021-11-15T10:15:39.664" v="551" actId="1036"/>
+          <ac:chgData name="Anatoliy Kigel" userId="7432c6c4687b0a9c" providerId="LiveId" clId="{5D4AC314-1861-4644-8302-1371808BB05F}" dt="2021-11-20T11:56:32.676" v="612" actId="552"/>
           <ac:spMkLst>
             <pc:docMk/>
             <pc:sldMk cId="3356359888" sldId="563"/>
@@ -582,8 +582,16 @@
             <ac:spMk id="3" creationId="{00000000-0000-0000-0000-000000000000}"/>
           </ac:spMkLst>
         </pc:spChg>
+        <pc:spChg chg="add mod">
+          <ac:chgData name="Anatoliy Kigel" userId="7432c6c4687b0a9c" providerId="LiveId" clId="{5D4AC314-1861-4644-8302-1371808BB05F}" dt="2021-11-20T11:56:32.676" v="612" actId="552"/>
+          <ac:spMkLst>
+            <pc:docMk/>
+            <pc:sldMk cId="3356359888" sldId="563"/>
+            <ac:spMk id="9" creationId="{FFEEB9E9-8524-4F4E-96DC-75F078B786F9}"/>
+          </ac:spMkLst>
+        </pc:spChg>
         <pc:spChg chg="mod">
-          <ac:chgData name="Anatoliy Kigel" userId="7432c6c4687b0a9c" providerId="LiveId" clId="{5D4AC314-1861-4644-8302-1371808BB05F}" dt="2021-11-15T10:16:14.754" v="576" actId="20577"/>
+          <ac:chgData name="Anatoliy Kigel" userId="7432c6c4687b0a9c" providerId="LiveId" clId="{5D4AC314-1861-4644-8302-1371808BB05F}" dt="2021-11-20T11:56:32.676" v="612" actId="552"/>
           <ac:spMkLst>
             <pc:docMk/>
             <pc:sldMk cId="3356359888" sldId="563"/>
@@ -900,7 +908,7 @@
             <a:fld id="{85522811-C5C6-42D2-A409-F8556720C93F}" type="datetimeFigureOut">
               <a:rPr lang="uk-UA" smtClean="0"/>
               <a:pPr/>
-              <a:t>15.11.2021</a:t>
+              <a:t>20.11.2021</a:t>
             </a:fld>
             <a:endParaRPr lang="uk-UA"/>
           </a:p>
@@ -1440,7 +1448,7 @@
             <a:fld id="{E6FC6B0D-6115-4D7C-8040-9C8E2349BB6E}" type="datetime1">
               <a:rPr lang="uk-UA" smtClean="0"/>
               <a:pPr/>
-              <a:t>15.11.2021</a:t>
+              <a:t>20.11.2021</a:t>
             </a:fld>
             <a:endParaRPr lang="uk-UA"/>
           </a:p>
@@ -1607,7 +1615,7 @@
             <a:fld id="{996367BA-0A39-4DE2-BFC3-D5290044365E}" type="datetime1">
               <a:rPr lang="uk-UA" smtClean="0"/>
               <a:pPr/>
-              <a:t>15.11.2021</a:t>
+              <a:t>20.11.2021</a:t>
             </a:fld>
             <a:endParaRPr lang="uk-UA"/>
           </a:p>
@@ -1784,7 +1792,7 @@
             <a:fld id="{1BD6A67F-6C29-47DC-AF8A-FDB3C787DF70}" type="datetime1">
               <a:rPr lang="uk-UA" smtClean="0"/>
               <a:pPr/>
-              <a:t>15.11.2021</a:t>
+              <a:t>20.11.2021</a:t>
             </a:fld>
             <a:endParaRPr lang="uk-UA"/>
           </a:p>
@@ -1951,7 +1959,7 @@
             <a:fld id="{1657D9C5-7FF1-434F-B56E-9BAD559744E9}" type="datetime1">
               <a:rPr lang="uk-UA" smtClean="0"/>
               <a:pPr/>
-              <a:t>15.11.2021</a:t>
+              <a:t>20.11.2021</a:t>
             </a:fld>
             <a:endParaRPr lang="uk-UA"/>
           </a:p>
@@ -2194,7 +2202,7 @@
             <a:fld id="{2CEB0FC9-DE63-476B-A1A9-BE934D9049F8}" type="datetime1">
               <a:rPr lang="uk-UA" smtClean="0"/>
               <a:pPr/>
-              <a:t>15.11.2021</a:t>
+              <a:t>20.11.2021</a:t>
             </a:fld>
             <a:endParaRPr lang="uk-UA"/>
           </a:p>
@@ -2479,7 +2487,7 @@
             <a:fld id="{F964460F-86E2-4DF6-9D0F-12F5005CF375}" type="datetime1">
               <a:rPr lang="uk-UA" smtClean="0"/>
               <a:pPr/>
-              <a:t>15.11.2021</a:t>
+              <a:t>20.11.2021</a:t>
             </a:fld>
             <a:endParaRPr lang="uk-UA"/>
           </a:p>
@@ -2898,7 +2906,7 @@
             <a:fld id="{C521715E-DDCD-4267-B0A5-2918B6F6768A}" type="datetime1">
               <a:rPr lang="uk-UA" smtClean="0"/>
               <a:pPr/>
-              <a:t>15.11.2021</a:t>
+              <a:t>20.11.2021</a:t>
             </a:fld>
             <a:endParaRPr lang="uk-UA"/>
           </a:p>
@@ -3013,7 +3021,7 @@
             <a:fld id="{9289842C-EB2D-4EBB-A272-2F6A49D9794D}" type="datetime1">
               <a:rPr lang="uk-UA" smtClean="0"/>
               <a:pPr/>
-              <a:t>15.11.2021</a:t>
+              <a:t>20.11.2021</a:t>
             </a:fld>
             <a:endParaRPr lang="uk-UA"/>
           </a:p>
@@ -3105,7 +3113,7 @@
             <a:fld id="{D036F091-B700-4B52-99AC-85D0FD94D904}" type="datetime1">
               <a:rPr lang="uk-UA" smtClean="0"/>
               <a:pPr/>
-              <a:t>15.11.2021</a:t>
+              <a:t>20.11.2021</a:t>
             </a:fld>
             <a:endParaRPr lang="uk-UA"/>
           </a:p>
@@ -3379,7 +3387,7 @@
             <a:fld id="{B35DFABA-3811-4634-B803-2EAC4CD0063B}" type="datetime1">
               <a:rPr lang="uk-UA" smtClean="0"/>
               <a:pPr/>
-              <a:t>15.11.2021</a:t>
+              <a:t>20.11.2021</a:t>
             </a:fld>
             <a:endParaRPr lang="uk-UA"/>
           </a:p>
@@ -3629,7 +3637,7 @@
             <a:fld id="{8A9EA25E-F88E-463A-A119-D1E55A881002}" type="datetime1">
               <a:rPr lang="uk-UA" smtClean="0"/>
               <a:pPr/>
-              <a:t>15.11.2021</a:t>
+              <a:t>20.11.2021</a:t>
             </a:fld>
             <a:endParaRPr lang="uk-UA"/>
           </a:p>
@@ -3839,7 +3847,7 @@
             <a:fld id="{E708ED03-0080-49A2-B709-7DA4ACB3A1C3}" type="datetime1">
               <a:rPr lang="uk-UA" smtClean="0"/>
               <a:pPr/>
-              <a:t>15.11.2021</a:t>
+              <a:t>20.11.2021</a:t>
             </a:fld>
             <a:endParaRPr lang="uk-UA"/>
           </a:p>
@@ -5772,7 +5780,7 @@
         <p:spPr>
           <a:xfrm>
             <a:off x="3359696" y="2560836"/>
-            <a:ext cx="8424936" cy="2308324"/>
+            <a:ext cx="8424936" cy="1754326"/>
           </a:xfrm>
           <a:prstGeom prst="rect">
             <a:avLst/>
@@ -5827,7 +5835,7 @@
           <a:p>
             <a:r>
               <a:rPr lang="ru-RU" b="1" dirty="0"/>
-              <a:t>Сохранённый</a:t>
+              <a:t>Можно взять сохранённый</a:t>
             </a:r>
             <a:r>
               <a:rPr lang="uk-UA" b="1" dirty="0"/>
@@ -5877,33 +5885,6 @@
           </a:p>
           <a:p>
             <a:endParaRPr lang="ru-RU" b="1" dirty="0">
-              <a:solidFill>
-                <a:schemeClr val="accent6">
-                  <a:lumMod val="75000"/>
-                </a:schemeClr>
-              </a:solidFill>
-            </a:endParaRPr>
-          </a:p>
-          <a:p>
-            <a:r>
-              <a:rPr lang="ru-RU" b="1" dirty="0">
-                <a:solidFill>
-                  <a:srgbClr val="00B050"/>
-                </a:solidFill>
-              </a:rPr>
-              <a:t>Доп. высокая сложность: </a:t>
-            </a:r>
-            <a:r>
-              <a:rPr lang="ru-RU" b="1" dirty="0">
-                <a:solidFill>
-                  <a:schemeClr val="accent6">
-                    <a:lumMod val="75000"/>
-                  </a:schemeClr>
-                </a:solidFill>
-              </a:rPr>
-              <a:t>интегрировать какой-либо картографический сервис и отобразить на странице карту с ближайшим терминалом. </a:t>
-            </a:r>
-            <a:endParaRPr lang="uk-UA" b="1" dirty="0">
               <a:solidFill>
                 <a:schemeClr val="accent6">
                   <a:lumMod val="75000"/>
@@ -5960,6 +5941,75 @@
           </a:extLst>
         </p:spPr>
       </p:pic>
+      <p:sp>
+        <p:nvSpPr>
+          <p:cNvPr id="9" name="TextBox 8">
+            <a:extLst>
+              <a:ext uri="{FF2B5EF4-FFF2-40B4-BE49-F238E27FC236}">
+                <a16:creationId xmlns:a16="http://schemas.microsoft.com/office/drawing/2014/main" id="{FFEEB9E9-8524-4F4E-96DC-75F078B786F9}"/>
+              </a:ext>
+            </a:extLst>
+          </p:cNvPr>
+          <p:cNvSpPr txBox="1"/>
+          <p:nvPr/>
+        </p:nvSpPr>
+        <p:spPr>
+          <a:xfrm>
+            <a:off x="3359696" y="4149080"/>
+            <a:ext cx="7704856" cy="646331"/>
+          </a:xfrm>
+          <a:prstGeom prst="rect">
+            <a:avLst/>
+          </a:prstGeom>
+        </p:spPr>
+        <p:style>
+          <a:lnRef idx="2">
+            <a:schemeClr val="accent6"/>
+          </a:lnRef>
+          <a:fillRef idx="1">
+            <a:schemeClr val="lt1"/>
+          </a:fillRef>
+          <a:effectRef idx="0">
+            <a:schemeClr val="accent6"/>
+          </a:effectRef>
+          <a:fontRef idx="minor">
+            <a:schemeClr val="dk1"/>
+          </a:fontRef>
+        </p:style>
+        <p:txBody>
+          <a:bodyPr wrap="square">
+            <a:spAutoFit/>
+          </a:bodyPr>
+          <a:lstStyle/>
+          <a:p>
+            <a:r>
+              <a:rPr lang="ru-RU" b="1" dirty="0">
+                <a:solidFill>
+                  <a:srgbClr val="00B050"/>
+                </a:solidFill>
+              </a:rPr>
+              <a:t>Доп. высокая сложность: </a:t>
+            </a:r>
+            <a:r>
+              <a:rPr lang="ru-RU" b="1" dirty="0">
+                <a:solidFill>
+                  <a:schemeClr val="accent6">
+                    <a:lumMod val="75000"/>
+                  </a:schemeClr>
+                </a:solidFill>
+              </a:rPr>
+              <a:t>интегрировать какой-либо картографический сервис и отобразить на странице карту с ближайшим терминалом. </a:t>
+            </a:r>
+            <a:endParaRPr lang="uk-UA" b="1" dirty="0">
+              <a:solidFill>
+                <a:schemeClr val="accent6">
+                  <a:lumMod val="75000"/>
+                </a:schemeClr>
+              </a:solidFill>
+            </a:endParaRPr>
+          </a:p>
+        </p:txBody>
+      </p:sp>
     </p:spTree>
     <p:extLst>
       <p:ext uri="{BB962C8B-B14F-4D97-AF65-F5344CB8AC3E}">
@@ -6065,7 +6115,14 @@
             <a:pPr algn="ctr"/>
             <a:r>
               <a:rPr lang="ru-RU" sz="6000" b="1" dirty="0"/>
-              <a:t>хранилище данных нашего приложения в браузере</a:t>
+              <a:t>хранилище данных </a:t>
+            </a:r>
+            <a:br>
+              <a:rPr lang="en-US" sz="6000" b="1" dirty="0"/>
+            </a:br>
+            <a:r>
+              <a:rPr lang="ru-RU" sz="6000" b="1" dirty="0"/>
+              <a:t>приложения в браузере</a:t>
             </a:r>
             <a:endParaRPr lang="uk-UA" sz="6000" b="1" dirty="0"/>
           </a:p>

</xml_diff>